<commit_message>
docs: updated paper to v0.5
</commit_message>
<xml_diff>
--- a/paper/ggoncoplotTable.pptx
+++ b/paper/ggoncoplotTable.pptx
@@ -296,7 +296,7 @@
           <a:p>
             <a:fld id="{65AC23F5-2FF7-8343-9F87-9EE16815F2F7}" type="datetimeFigureOut">
               <a:rPr lang="en-US" smtClean="0"/>
-              <a:t>7/2/24</a:t>
+              <a:t>7/11/24</a:t>
             </a:fld>
             <a:endParaRPr lang="en-US"/>
           </a:p>
@@ -494,7 +494,7 @@
           <a:p>
             <a:fld id="{65AC23F5-2FF7-8343-9F87-9EE16815F2F7}" type="datetimeFigureOut">
               <a:rPr lang="en-US" smtClean="0"/>
-              <a:t>7/2/24</a:t>
+              <a:t>7/11/24</a:t>
             </a:fld>
             <a:endParaRPr lang="en-US"/>
           </a:p>
@@ -702,7 +702,7 @@
           <a:p>
             <a:fld id="{65AC23F5-2FF7-8343-9F87-9EE16815F2F7}" type="datetimeFigureOut">
               <a:rPr lang="en-US" smtClean="0"/>
-              <a:t>7/2/24</a:t>
+              <a:t>7/11/24</a:t>
             </a:fld>
             <a:endParaRPr lang="en-US"/>
           </a:p>
@@ -900,7 +900,7 @@
           <a:p>
             <a:fld id="{65AC23F5-2FF7-8343-9F87-9EE16815F2F7}" type="datetimeFigureOut">
               <a:rPr lang="en-US" smtClean="0"/>
-              <a:t>7/2/24</a:t>
+              <a:t>7/11/24</a:t>
             </a:fld>
             <a:endParaRPr lang="en-US"/>
           </a:p>
@@ -1175,7 +1175,7 @@
           <a:p>
             <a:fld id="{65AC23F5-2FF7-8343-9F87-9EE16815F2F7}" type="datetimeFigureOut">
               <a:rPr lang="en-US" smtClean="0"/>
-              <a:t>7/2/24</a:t>
+              <a:t>7/11/24</a:t>
             </a:fld>
             <a:endParaRPr lang="en-US"/>
           </a:p>
@@ -1440,7 +1440,7 @@
           <a:p>
             <a:fld id="{65AC23F5-2FF7-8343-9F87-9EE16815F2F7}" type="datetimeFigureOut">
               <a:rPr lang="en-US" smtClean="0"/>
-              <a:t>7/2/24</a:t>
+              <a:t>7/11/24</a:t>
             </a:fld>
             <a:endParaRPr lang="en-US"/>
           </a:p>
@@ -1852,7 +1852,7 @@
           <a:p>
             <a:fld id="{65AC23F5-2FF7-8343-9F87-9EE16815F2F7}" type="datetimeFigureOut">
               <a:rPr lang="en-US" smtClean="0"/>
-              <a:t>7/2/24</a:t>
+              <a:t>7/11/24</a:t>
             </a:fld>
             <a:endParaRPr lang="en-US"/>
           </a:p>
@@ -1993,7 +1993,7 @@
           <a:p>
             <a:fld id="{65AC23F5-2FF7-8343-9F87-9EE16815F2F7}" type="datetimeFigureOut">
               <a:rPr lang="en-US" smtClean="0"/>
-              <a:t>7/2/24</a:t>
+              <a:t>7/11/24</a:t>
             </a:fld>
             <a:endParaRPr lang="en-US"/>
           </a:p>
@@ -2106,7 +2106,7 @@
           <a:p>
             <a:fld id="{65AC23F5-2FF7-8343-9F87-9EE16815F2F7}" type="datetimeFigureOut">
               <a:rPr lang="en-US" smtClean="0"/>
-              <a:t>7/2/24</a:t>
+              <a:t>7/11/24</a:t>
             </a:fld>
             <a:endParaRPr lang="en-US"/>
           </a:p>
@@ -2417,7 +2417,7 @@
           <a:p>
             <a:fld id="{65AC23F5-2FF7-8343-9F87-9EE16815F2F7}" type="datetimeFigureOut">
               <a:rPr lang="en-US" smtClean="0"/>
-              <a:t>7/2/24</a:t>
+              <a:t>7/11/24</a:t>
             </a:fld>
             <a:endParaRPr lang="en-US"/>
           </a:p>
@@ -2705,7 +2705,7 @@
           <a:p>
             <a:fld id="{65AC23F5-2FF7-8343-9F87-9EE16815F2F7}" type="datetimeFigureOut">
               <a:rPr lang="en-US" smtClean="0"/>
-              <a:t>7/2/24</a:t>
+              <a:t>7/11/24</a:t>
             </a:fld>
             <a:endParaRPr lang="en-US"/>
           </a:p>
@@ -2946,7 +2946,7 @@
           <a:p>
             <a:fld id="{65AC23F5-2FF7-8343-9F87-9EE16815F2F7}" type="datetimeFigureOut">
               <a:rPr lang="en-US" smtClean="0"/>
-              <a:t>7/2/24</a:t>
+              <a:t>7/11/24</a:t>
             </a:fld>
             <a:endParaRPr lang="en-US"/>
           </a:p>
@@ -3378,14 +3378,14 @@
           <p:nvPr>
             <p:extLst>
               <p:ext uri="{D42A27DB-BD31-4B8C-83A1-F6EECF244321}">
-                <p14:modId xmlns:p14="http://schemas.microsoft.com/office/powerpoint/2010/main" val="159815861"/>
+                <p14:modId xmlns:p14="http://schemas.microsoft.com/office/powerpoint/2010/main" val="3116077635"/>
               </p:ext>
             </p:extLst>
           </p:nvPr>
         </p:nvGraphicFramePr>
         <p:xfrm>
-          <a:off x="1035907" y="255097"/>
-          <a:ext cx="10122244" cy="6299138"/>
+          <a:off x="1035907" y="255098"/>
+          <a:ext cx="10122244" cy="6604884"/>
         </p:xfrm>
         <a:graphic>
           <a:graphicData uri="http://schemas.openxmlformats.org/drawingml/2006/table">
@@ -3430,7 +3430,7 @@
                   </a:extLst>
                 </a:gridCol>
               </a:tblGrid>
-              <a:tr h="339113">
+              <a:tr h="282690">
                 <a:tc>
                   <a:txBody>
                     <a:bodyPr/>
@@ -3593,7 +3593,7 @@
                   </a:ext>
                 </a:extLst>
               </a:tr>
-              <a:tr h="397102">
+              <a:tr h="482756">
                 <a:tc>
                   <a:txBody>
                     <a:bodyPr/>
@@ -3763,7 +3763,7 @@
                   </a:ext>
                 </a:extLst>
               </a:tr>
-              <a:tr h="371516">
+              <a:tr h="482756">
                 <a:tc>
                   <a:txBody>
                     <a:bodyPr/>
@@ -3915,7 +3915,7 @@
                   </a:ext>
                 </a:extLst>
               </a:tr>
-              <a:tr h="517007">
+              <a:tr h="482756">
                 <a:tc>
                   <a:txBody>
                     <a:bodyPr/>
@@ -4091,7 +4091,7 @@
                   </a:ext>
                 </a:extLst>
               </a:tr>
-              <a:tr h="517007">
+              <a:tr h="482756">
                 <a:tc>
                   <a:txBody>
                     <a:bodyPr/>
@@ -4267,7 +4267,7 @@
                   </a:ext>
                 </a:extLst>
               </a:tr>
-              <a:tr h="473406">
+              <a:tr h="482756">
                 <a:tc>
                   <a:txBody>
                     <a:bodyPr/>
@@ -4443,7 +4443,7 @@
                   </a:ext>
                 </a:extLst>
               </a:tr>
-              <a:tr h="433301">
+              <a:tr h="482756">
                 <a:tc>
                   <a:txBody>
                     <a:bodyPr/>
@@ -4625,25 +4625,32 @@
                   </a:ext>
                 </a:extLst>
               </a:tr>
-              <a:tr h="435558">
-                <a:tc>
-                  <a:txBody>
-                    <a:bodyPr/>
-                    <a:lstStyle/>
-                    <a:p>
-                      <a:pPr marL="0" marR="0" fontAlgn="auto">
-                        <a:spcBef>
-                          <a:spcPts val="0"/>
-                        </a:spcBef>
-                        <a:spcAft>
-                          <a:spcPts val="0"/>
-                        </a:spcAft>
-                      </a:pPr>
-                      <a:r>
-                        <a:rPr lang="en-US" sz="1400" kern="100" dirty="0">
-                          <a:effectLst/>
-                        </a:rPr>
-                        <a:t>Allows any mutation dictionary to be used</a:t>
+              <a:tr h="482756">
+                <a:tc>
+                  <a:txBody>
+                    <a:bodyPr/>
+                    <a:lstStyle/>
+                    <a:p>
+                      <a:pPr marL="0" marR="0" indent="0" algn="l" defTabSz="914400" rtl="0" eaLnBrk="1" fontAlgn="auto" latinLnBrk="0" hangingPunct="1">
+                        <a:lnSpc>
+                          <a:spcPct val="100000"/>
+                        </a:lnSpc>
+                        <a:spcBef>
+                          <a:spcPts val="0"/>
+                        </a:spcBef>
+                        <a:spcAft>
+                          <a:spcPts val="0"/>
+                        </a:spcAft>
+                        <a:buClrTx/>
+                        <a:buSzTx/>
+                        <a:buFontTx/>
+                        <a:buNone/>
+                        <a:tabLst/>
+                        <a:defRPr/>
+                      </a:pPr>
+                      <a:r>
+                        <a:rPr lang="en-US" sz="1400" dirty="0"/>
+                        <a:t>Color tiles based on any feature describing mutations</a:t>
                       </a:r>
                       <a:endParaRPr lang="en-US" sz="1600" kern="100" dirty="0">
                         <a:effectLst/>
@@ -4704,7 +4711,7 @@
                         </a:spcAft>
                       </a:pPr>
                       <a:r>
-                        <a:rPr lang="en-US" sz="1400" kern="100">
+                        <a:rPr lang="en-US" sz="1400" kern="100" dirty="0">
                           <a:effectLst/>
                           <a:highlight>
                             <a:srgbClr val="BB9B8E"/>
@@ -4712,11 +4719,14 @@
                         </a:rPr>
                         <a:t>No</a:t>
                       </a:r>
-                      <a:endParaRPr lang="en-US" sz="1600" kern="100">
-                        <a:effectLst/>
-                        <a:highlight>
-                          <a:srgbClr val="BB9B8E"/>
-                        </a:highlight>
+                      <a:r>
+                        <a:rPr lang="en-US" sz="1600" kern="100" baseline="30000" dirty="0">
+                          <a:effectLst/>
+                        </a:rPr>
+                        <a:t>2</a:t>
+                      </a:r>
+                      <a:endParaRPr lang="en-US" sz="1600" kern="100" dirty="0">
+                        <a:effectLst/>
                         <a:latin typeface="Arial" panose="020B0604020202020204" pitchFamily="34" charset="0"/>
                         <a:ea typeface="Times New Roman" panose="02020603050405020304" pitchFamily="18" charset="0"/>
                         <a:cs typeface="Times New Roman" panose="02020603050405020304" pitchFamily="18" charset="0"/>
@@ -4801,7 +4811,7 @@
                   </a:ext>
                 </a:extLst>
               </a:tr>
-              <a:tr h="585107">
+              <a:tr h="587585">
                 <a:tc>
                   <a:txBody>
                     <a:bodyPr/>
@@ -4971,25 +4981,34 @@
                   </a:ext>
                 </a:extLst>
               </a:tr>
-              <a:tr h="761614">
-                <a:tc>
-                  <a:txBody>
-                    <a:bodyPr/>
-                    <a:lstStyle/>
-                    <a:p>
-                      <a:pPr marL="0" marR="0" fontAlgn="auto">
-                        <a:spcBef>
-                          <a:spcPts val="0"/>
-                        </a:spcBef>
-                        <a:spcAft>
-                          <a:spcPts val="0"/>
-                        </a:spcAft>
+              <a:tr h="587585">
+                <a:tc>
+                  <a:txBody>
+                    <a:bodyPr/>
+                    <a:lstStyle/>
+                    <a:p>
+                      <a:pPr marL="0" marR="0" indent="0" algn="l" defTabSz="914400" rtl="0" eaLnBrk="1" fontAlgn="auto" latinLnBrk="0" hangingPunct="1">
+                        <a:lnSpc>
+                          <a:spcPct val="100000"/>
+                        </a:lnSpc>
+                        <a:spcBef>
+                          <a:spcPts val="0"/>
+                        </a:spcBef>
+                        <a:spcAft>
+                          <a:spcPts val="0"/>
+                        </a:spcAft>
+                        <a:buClrTx/>
+                        <a:buSzTx/>
+                        <a:buFontTx/>
+                        <a:buNone/>
+                        <a:tabLst/>
+                        <a:defRPr/>
                       </a:pPr>
                       <a:r>
                         <a:rPr lang="en-US" sz="1400" kern="100" dirty="0">
                           <a:effectLst/>
                         </a:rPr>
-                        <a:t>Approach for resolving genes with multiple mutations</a:t>
+                        <a:t>Approach for distinguishing genes with multiple mutations (e.g. second-hits)</a:t>
                       </a:r>
                       <a:endParaRPr lang="en-US" sz="1600" kern="100" dirty="0">
                         <a:effectLst/>
@@ -5036,7 +5055,7 @@
                         <a:rPr lang="en-US" sz="1400" kern="100" baseline="30000" dirty="0">
                           <a:effectLst/>
                         </a:rPr>
-                        <a:t>2</a:t>
+                        <a:t>3</a:t>
                       </a:r>
                       <a:endParaRPr lang="en-US" sz="1600" kern="100" dirty="0">
                         <a:effectLst/>
@@ -5106,7 +5125,7 @@
                         <a:rPr lang="en-US" sz="1400" kern="100" baseline="30000" dirty="0">
                           <a:effectLst/>
                         </a:rPr>
-                        <a:t>3</a:t>
+                        <a:t>4</a:t>
                       </a:r>
                       <a:endParaRPr lang="en-US" sz="1600" kern="100" dirty="0">
                         <a:effectLst/>
@@ -5159,7 +5178,7 @@
                   </a:ext>
                 </a:extLst>
               </a:tr>
-              <a:tr h="367627">
+              <a:tr h="482756">
                 <a:tc>
                   <a:txBody>
                     <a:bodyPr/>
@@ -5177,7 +5196,19 @@
                         <a:rPr lang="en-US" sz="1400" kern="100" dirty="0">
                           <a:effectLst/>
                         </a:rPr>
-                        <a:t>Supports a mutation level dataset as input</a:t>
+                        <a:t>Supports datasets where </a:t>
+                      </a:r>
+                      <a:r>
+                        <a:rPr lang="en-US" sz="1400" kern="100">
+                          <a:effectLst/>
+                        </a:rPr>
+                        <a:t>rows represent </a:t>
+                      </a:r>
+                      <a:r>
+                        <a:rPr lang="en-US" sz="1400" kern="100" dirty="0">
+                          <a:effectLst/>
+                        </a:rPr>
+                        <a:t>mutations not genes</a:t>
                       </a:r>
                       <a:endParaRPr lang="en-US" sz="1600" kern="100" dirty="0">
                         <a:effectLst/>
@@ -5203,7 +5234,7 @@
                         </a:spcAft>
                       </a:pPr>
                       <a:r>
-                        <a:rPr lang="en-US" sz="1400" kern="100">
+                        <a:rPr lang="en-US" sz="1400" kern="100" dirty="0">
                           <a:effectLst/>
                           <a:highlight>
                             <a:srgbClr val="BB9B8E"/>
@@ -5212,19 +5243,13 @@
                         <a:t>No</a:t>
                       </a:r>
                       <a:r>
-                        <a:rPr lang="en-US" sz="1400" kern="100" baseline="30000">
-                          <a:effectLst/>
-                          <a:highlight>
-                            <a:srgbClr val="BB9B8E"/>
-                          </a:highlight>
-                        </a:rPr>
-                        <a:t>4</a:t>
-                      </a:r>
-                      <a:endParaRPr lang="en-US" sz="1600" kern="100">
-                        <a:effectLst/>
-                        <a:highlight>
-                          <a:srgbClr val="BB9B8E"/>
-                        </a:highlight>
+                        <a:rPr lang="en-US" sz="1400" kern="100" baseline="30000" dirty="0">
+                          <a:effectLst/>
+                        </a:rPr>
+                        <a:t>5</a:t>
+                      </a:r>
+                      <a:endParaRPr lang="en-US" sz="1600" kern="100" dirty="0">
+                        <a:effectLst/>
                         <a:latin typeface="Arial" panose="020B0604020202020204" pitchFamily="34" charset="0"/>
                         <a:ea typeface="Times New Roman" panose="02020603050405020304" pitchFamily="18" charset="0"/>
                         <a:cs typeface="Times New Roman" panose="02020603050405020304" pitchFamily="18" charset="0"/>
@@ -5344,7 +5369,7 @@
                   </a:ext>
                 </a:extLst>
               </a:tr>
-              <a:tr h="367627">
+              <a:tr h="482756">
                 <a:tc>
                   <a:txBody>
                     <a:bodyPr/>
@@ -5520,7 +5545,7 @@
                   </a:ext>
                 </a:extLst>
               </a:tr>
-              <a:tr h="517007">
+              <a:tr h="587585">
                 <a:tc>
                   <a:txBody>
                     <a:bodyPr/>
@@ -5564,7 +5589,7 @@
                         </a:spcAft>
                       </a:pPr>
                       <a:r>
-                        <a:rPr lang="en-US" sz="1400" b="1" kern="100">
+                        <a:rPr lang="en-US" sz="1400" b="1" kern="100" dirty="0">
                           <a:effectLst/>
                           <a:highlight>
                             <a:srgbClr val="C6E0B4"/>
@@ -5572,7 +5597,7 @@
                         </a:rPr>
                         <a:t>Yes</a:t>
                       </a:r>
-                      <a:endParaRPr lang="en-US" sz="1600" b="1" kern="100">
+                      <a:endParaRPr lang="en-US" sz="1600" b="1" kern="100" dirty="0">
                         <a:effectLst/>
                         <a:highlight>
                           <a:srgbClr val="C6E0B4"/>

</xml_diff>

<commit_message>
docs: updated ggoncoplot table ppt
</commit_message>
<xml_diff>
--- a/paper/ggoncoplotTable.pptx
+++ b/paper/ggoncoplotTable.pptx
@@ -3378,7 +3378,7 @@
           <p:nvPr>
             <p:extLst>
               <p:ext uri="{D42A27DB-BD31-4B8C-83A1-F6EECF244321}">
-                <p14:modId xmlns:p14="http://schemas.microsoft.com/office/powerpoint/2010/main" val="3116077635"/>
+                <p14:modId xmlns:p14="http://schemas.microsoft.com/office/powerpoint/2010/main" val="2604507575"/>
               </p:ext>
             </p:extLst>
           </p:nvPr>
@@ -5196,19 +5196,7 @@
                         <a:rPr lang="en-US" sz="1400" kern="100" dirty="0">
                           <a:effectLst/>
                         </a:rPr>
-                        <a:t>Supports datasets where </a:t>
-                      </a:r>
-                      <a:r>
-                        <a:rPr lang="en-US" sz="1400" kern="100">
-                          <a:effectLst/>
-                        </a:rPr>
-                        <a:t>rows represent </a:t>
-                      </a:r>
-                      <a:r>
-                        <a:rPr lang="en-US" sz="1400" kern="100" dirty="0">
-                          <a:effectLst/>
-                        </a:rPr>
-                        <a:t>mutations not genes</a:t>
+                        <a:t>Supports datasets where rows represent mutations not genes</a:t>
                       </a:r>
                       <a:endParaRPr lang="en-US" sz="1600" kern="100" dirty="0">
                         <a:effectLst/>

</xml_diff>